<commit_message>
Add initial sensor config - Update UI
</commit_message>
<xml_diff>
--- a/Imágenes.pptx
+++ b/Imágenes.pptx
@@ -106,6 +106,11 @@
       </a:defRPr>
     </a:lvl9pPr>
   </p:defaultTextStyle>
+  <p:extLst>
+    <p:ext uri="{EFAFB233-063F-42B5-8137-9DF3F51BA10A}">
+      <p15:sldGuideLst xmlns:p15="http://schemas.microsoft.com/office/powerpoint/2012/main"/>
+    </p:ext>
+  </p:extLst>
 </p:presentation>
 </file>
 
@@ -258,7 +263,7 @@
           <a:p>
             <a:fld id="{9C2A34A2-3DF3-476D-B273-44D760859E48}" type="datetimeFigureOut">
               <a:rPr lang="es-CO" smtClean="0"/>
-              <a:t>29/07/2022</a:t>
+              <a:t>12/09/2022</a:t>
             </a:fld>
             <a:endParaRPr lang="es-CO"/>
           </a:p>
@@ -458,7 +463,7 @@
           <a:p>
             <a:fld id="{9C2A34A2-3DF3-476D-B273-44D760859E48}" type="datetimeFigureOut">
               <a:rPr lang="es-CO" smtClean="0"/>
-              <a:t>29/07/2022</a:t>
+              <a:t>12/09/2022</a:t>
             </a:fld>
             <a:endParaRPr lang="es-CO"/>
           </a:p>
@@ -668,7 +673,7 @@
           <a:p>
             <a:fld id="{9C2A34A2-3DF3-476D-B273-44D760859E48}" type="datetimeFigureOut">
               <a:rPr lang="es-CO" smtClean="0"/>
-              <a:t>29/07/2022</a:t>
+              <a:t>12/09/2022</a:t>
             </a:fld>
             <a:endParaRPr lang="es-CO"/>
           </a:p>
@@ -868,7 +873,7 @@
           <a:p>
             <a:fld id="{9C2A34A2-3DF3-476D-B273-44D760859E48}" type="datetimeFigureOut">
               <a:rPr lang="es-CO" smtClean="0"/>
-              <a:t>29/07/2022</a:t>
+              <a:t>12/09/2022</a:t>
             </a:fld>
             <a:endParaRPr lang="es-CO"/>
           </a:p>
@@ -1144,7 +1149,7 @@
           <a:p>
             <a:fld id="{9C2A34A2-3DF3-476D-B273-44D760859E48}" type="datetimeFigureOut">
               <a:rPr lang="es-CO" smtClean="0"/>
-              <a:t>29/07/2022</a:t>
+              <a:t>12/09/2022</a:t>
             </a:fld>
             <a:endParaRPr lang="es-CO"/>
           </a:p>
@@ -1412,7 +1417,7 @@
           <a:p>
             <a:fld id="{9C2A34A2-3DF3-476D-B273-44D760859E48}" type="datetimeFigureOut">
               <a:rPr lang="es-CO" smtClean="0"/>
-              <a:t>29/07/2022</a:t>
+              <a:t>12/09/2022</a:t>
             </a:fld>
             <a:endParaRPr lang="es-CO"/>
           </a:p>
@@ -1827,7 +1832,7 @@
           <a:p>
             <a:fld id="{9C2A34A2-3DF3-476D-B273-44D760859E48}" type="datetimeFigureOut">
               <a:rPr lang="es-CO" smtClean="0"/>
-              <a:t>29/07/2022</a:t>
+              <a:t>12/09/2022</a:t>
             </a:fld>
             <a:endParaRPr lang="es-CO"/>
           </a:p>
@@ -1969,7 +1974,7 @@
           <a:p>
             <a:fld id="{9C2A34A2-3DF3-476D-B273-44D760859E48}" type="datetimeFigureOut">
               <a:rPr lang="es-CO" smtClean="0"/>
-              <a:t>29/07/2022</a:t>
+              <a:t>12/09/2022</a:t>
             </a:fld>
             <a:endParaRPr lang="es-CO"/>
           </a:p>
@@ -2082,7 +2087,7 @@
           <a:p>
             <a:fld id="{9C2A34A2-3DF3-476D-B273-44D760859E48}" type="datetimeFigureOut">
               <a:rPr lang="es-CO" smtClean="0"/>
-              <a:t>29/07/2022</a:t>
+              <a:t>12/09/2022</a:t>
             </a:fld>
             <a:endParaRPr lang="es-CO"/>
           </a:p>
@@ -2395,7 +2400,7 @@
           <a:p>
             <a:fld id="{9C2A34A2-3DF3-476D-B273-44D760859E48}" type="datetimeFigureOut">
               <a:rPr lang="es-CO" smtClean="0"/>
-              <a:t>29/07/2022</a:t>
+              <a:t>12/09/2022</a:t>
             </a:fld>
             <a:endParaRPr lang="es-CO"/>
           </a:p>
@@ -2684,7 +2689,7 @@
           <a:p>
             <a:fld id="{9C2A34A2-3DF3-476D-B273-44D760859E48}" type="datetimeFigureOut">
               <a:rPr lang="es-CO" smtClean="0"/>
-              <a:t>29/07/2022</a:t>
+              <a:t>12/09/2022</a:t>
             </a:fld>
             <a:endParaRPr lang="es-CO"/>
           </a:p>
@@ -2927,7 +2932,7 @@
           <a:p>
             <a:fld id="{9C2A34A2-3DF3-476D-B273-44D760859E48}" type="datetimeFigureOut">
               <a:rPr lang="es-CO" smtClean="0"/>
-              <a:t>29/07/2022</a:t>
+              <a:t>12/09/2022</a:t>
             </a:fld>
             <a:endParaRPr lang="es-CO"/>
           </a:p>
@@ -3475,8 +3480,8 @@
           </a:stretch>
         </p:blipFill>
         <p:spPr>
-          <a:xfrm rot="21027240">
-            <a:off x="3895725" y="4397375"/>
+          <a:xfrm rot="-20940000">
+            <a:off x="4190694" y="4397375"/>
             <a:ext cx="4400550" cy="1333500"/>
           </a:xfrm>
           <a:prstGeom prst="rect">
@@ -3537,7 +3542,7 @@
         </p:blipFill>
         <p:spPr>
           <a:xfrm>
-            <a:off x="7650862" y="5210174"/>
+            <a:off x="4504530" y="5210174"/>
             <a:ext cx="295179" cy="740681"/>
           </a:xfrm>
           <a:prstGeom prst="rect">
@@ -3839,8 +3844,8 @@
           </a:fontRef>
         </p:style>
       </p:cxnSp>
-      <mc:AlternateContent xmlns:mc="http://schemas.openxmlformats.org/markup-compatibility/2006">
-        <mc:Choice xmlns:a14="http://schemas.microsoft.com/office/drawing/2010/main" Requires="a14">
+      <mc:AlternateContent xmlns:mc="http://schemas.openxmlformats.org/markup-compatibility/2006" xmlns:a14="http://schemas.microsoft.com/office/drawing/2010/main">
+        <mc:Choice Requires="a14">
           <p:sp>
             <p:nvSpPr>
               <p:cNvPr id="29" name="CuadroTexto 28">
@@ -3871,6 +3876,7 @@
               </a:bodyPr>
               <a:lstStyle/>
               <a:p>
+                <a:pPr/>
                 <a14:m>
                   <m:oMathPara xmlns:m="http://schemas.openxmlformats.org/officeDocument/2006/math">
                     <m:oMathParaPr>
@@ -3910,7 +3916,7 @@
             </p:txBody>
           </p:sp>
         </mc:Choice>
-        <mc:Fallback>
+        <mc:Fallback xmlns="">
           <p:sp>
             <p:nvSpPr>
               <p:cNvPr id="29" name="CuadroTexto 28">
@@ -3955,8 +3961,8 @@
           </p:sp>
         </mc:Fallback>
       </mc:AlternateContent>
-      <mc:AlternateContent xmlns:mc="http://schemas.openxmlformats.org/markup-compatibility/2006">
-        <mc:Choice xmlns:a14="http://schemas.microsoft.com/office/drawing/2010/main" Requires="a14">
+      <mc:AlternateContent xmlns:mc="http://schemas.openxmlformats.org/markup-compatibility/2006" xmlns:a14="http://schemas.microsoft.com/office/drawing/2010/main">
+        <mc:Choice Requires="a14">
           <p:sp>
             <p:nvSpPr>
               <p:cNvPr id="32" name="CuadroTexto 31">
@@ -3987,6 +3993,7 @@
               </a:bodyPr>
               <a:lstStyle/>
               <a:p>
+                <a:pPr/>
                 <a14:m>
                   <m:oMathPara xmlns:m="http://schemas.openxmlformats.org/officeDocument/2006/math">
                     <m:oMathParaPr>
@@ -4026,7 +4033,7 @@
             </p:txBody>
           </p:sp>
         </mc:Choice>
-        <mc:Fallback>
+        <mc:Fallback xmlns="">
           <p:sp>
             <p:nvSpPr>
               <p:cNvPr id="32" name="CuadroTexto 31">
@@ -4188,8 +4195,8 @@
           </a:fontRef>
         </p:style>
       </p:cxnSp>
-      <mc:AlternateContent xmlns:mc="http://schemas.openxmlformats.org/markup-compatibility/2006">
-        <mc:Choice xmlns:a14="http://schemas.microsoft.com/office/drawing/2010/main" Requires="a14">
+      <mc:AlternateContent xmlns:mc="http://schemas.openxmlformats.org/markup-compatibility/2006" xmlns:a14="http://schemas.microsoft.com/office/drawing/2010/main">
+        <mc:Choice Requires="a14">
           <p:sp>
             <p:nvSpPr>
               <p:cNvPr id="36" name="CuadroTexto 35">
@@ -4220,6 +4227,7 @@
               </a:bodyPr>
               <a:lstStyle/>
               <a:p>
+                <a:pPr/>
                 <a14:m>
                   <m:oMathPara xmlns:m="http://schemas.openxmlformats.org/officeDocument/2006/math">
                     <m:oMathParaPr>
@@ -4259,7 +4267,7 @@
             </p:txBody>
           </p:sp>
         </mc:Choice>
-        <mc:Fallback>
+        <mc:Fallback xmlns="">
           <p:sp>
             <p:nvSpPr>
               <p:cNvPr id="36" name="CuadroTexto 35">
@@ -4421,8 +4429,8 @@
           </a:fontRef>
         </p:style>
       </p:cxnSp>
-      <mc:AlternateContent xmlns:mc="http://schemas.openxmlformats.org/markup-compatibility/2006">
-        <mc:Choice xmlns:a14="http://schemas.microsoft.com/office/drawing/2010/main" Requires="a14">
+      <mc:AlternateContent xmlns:mc="http://schemas.openxmlformats.org/markup-compatibility/2006" xmlns:a14="http://schemas.microsoft.com/office/drawing/2010/main">
+        <mc:Choice Requires="a14">
           <p:sp>
             <p:nvSpPr>
               <p:cNvPr id="43" name="CuadroTexto 42">
@@ -4453,6 +4461,7 @@
               </a:bodyPr>
               <a:lstStyle/>
               <a:p>
+                <a:pPr/>
                 <a14:m>
                   <m:oMathPara xmlns:m="http://schemas.openxmlformats.org/officeDocument/2006/math">
                     <m:oMathParaPr>
@@ -4492,7 +4501,7 @@
             </p:txBody>
           </p:sp>
         </mc:Choice>
-        <mc:Fallback>
+        <mc:Fallback xmlns="">
           <p:sp>
             <p:nvSpPr>
               <p:cNvPr id="43" name="CuadroTexto 42">
@@ -4553,8 +4562,8 @@
         </p:nvCxnSpPr>
         <p:spPr>
           <a:xfrm>
-            <a:off x="8398043" y="5066934"/>
-            <a:ext cx="0" cy="880355"/>
+            <a:off x="4012841" y="5210174"/>
+            <a:ext cx="0" cy="737115"/>
           </a:xfrm>
           <a:prstGeom prst="line">
             <a:avLst/>
@@ -4592,7 +4601,7 @@
         </p:nvCxnSpPr>
         <p:spPr>
           <a:xfrm rot="5400000" flipV="1">
-            <a:off x="8394178" y="4973577"/>
+            <a:off x="4008977" y="5105365"/>
             <a:ext cx="0" cy="186715"/>
           </a:xfrm>
           <a:prstGeom prst="line">
@@ -4631,7 +4640,7 @@
         </p:nvCxnSpPr>
         <p:spPr>
           <a:xfrm rot="5400000" flipV="1">
-            <a:off x="8394179" y="5838806"/>
+            <a:off x="4008977" y="5838806"/>
             <a:ext cx="0" cy="186715"/>
           </a:xfrm>
           <a:prstGeom prst="line">
@@ -4670,7 +4679,7 @@
             </p:nvSpPr>
             <p:spPr>
               <a:xfrm>
-                <a:off x="8236851" y="5297405"/>
+                <a:off x="3847839" y="5352650"/>
                 <a:ext cx="304025" cy="400110"/>
               </a:xfrm>
               <a:prstGeom prst="rect">
@@ -4686,6 +4695,7 @@
               </a:bodyPr>
               <a:lstStyle/>
               <a:p>
+                <a:pPr/>
                 <a14:m>
                   <m:oMathPara xmlns:m="http://schemas.openxmlformats.org/officeDocument/2006/math">
                     <m:oMathParaPr>
@@ -4723,7 +4733,7 @@
             </p:nvSpPr>
             <p:spPr>
               <a:xfrm>
-                <a:off x="8236851" y="5297405"/>
+                <a:off x="3847839" y="5352650"/>
                 <a:ext cx="304025" cy="400110"/>
               </a:xfrm>
               <a:prstGeom prst="rect">

</xml_diff>